<commit_message>
switched settings to user for saving; switched color of form to black; added default logdir \saved; added ppt template to resources; ppt also black; 2pick layout positioning works;
</commit_message>
<xml_diff>
--- a/MyLog/PPT.pptx
+++ b/MyLog/PPT.pptx
@@ -5,8 +5,11 @@
     <p:sldMasterId id="2147483648" r:id="rId1"/>
   </p:sldMasterIdLst>
   <p:notesMasterIdLst>
-    <p:notesMasterId r:id="rId2"/>
+    <p:notesMasterId r:id="rId3"/>
   </p:notesMasterIdLst>
+  <p:sldIdLst>
+    <p:sldId id="258" r:id="rId2"/>
+  </p:sldIdLst>
   <p:sldSz cx="12192000" cy="6858000"/>
   <p:notesSz cx="6858000" cy="9144000"/>
   <p:defaultTextStyle>
@@ -194,7 +197,7 @@
           <a:p>
             <a:fld id="{CBDF3248-906E-46AC-8877-94AF4152B92E}" type="datetimeFigureOut">
               <a:rPr lang="en-US" smtClean="0"/>
-              <a:t>3/22/2022</a:t>
+              <a:t>4/11/2022</a:t>
             </a:fld>
             <a:endParaRPr lang="en-US"/>
           </a:p>
@@ -593,7 +596,7 @@
           <a:p>
             <a:fld id="{F94C261F-0441-47C0-ADC3-01E04E542625}" type="datetimeFigureOut">
               <a:rPr lang="en-US" smtClean="0"/>
-              <a:t>3/22/2022</a:t>
+              <a:t>4/11/2022</a:t>
             </a:fld>
             <a:endParaRPr lang="en-US"/>
           </a:p>
@@ -763,7 +766,7 @@
           <a:p>
             <a:fld id="{F94C261F-0441-47C0-ADC3-01E04E542625}" type="datetimeFigureOut">
               <a:rPr lang="en-US" smtClean="0"/>
-              <a:t>3/22/2022</a:t>
+              <a:t>4/11/2022</a:t>
             </a:fld>
             <a:endParaRPr lang="en-US"/>
           </a:p>
@@ -943,7 +946,7 @@
           <a:p>
             <a:fld id="{F94C261F-0441-47C0-ADC3-01E04E542625}" type="datetimeFigureOut">
               <a:rPr lang="en-US" smtClean="0"/>
-              <a:t>3/22/2022</a:t>
+              <a:t>4/11/2022</a:t>
             </a:fld>
             <a:endParaRPr lang="en-US"/>
           </a:p>
@@ -1113,7 +1116,7 @@
           <a:p>
             <a:fld id="{F94C261F-0441-47C0-ADC3-01E04E542625}" type="datetimeFigureOut">
               <a:rPr lang="en-US" smtClean="0"/>
-              <a:t>3/22/2022</a:t>
+              <a:t>4/11/2022</a:t>
             </a:fld>
             <a:endParaRPr lang="en-US"/>
           </a:p>
@@ -1359,7 +1362,7 @@
           <a:p>
             <a:fld id="{F94C261F-0441-47C0-ADC3-01E04E542625}" type="datetimeFigureOut">
               <a:rPr lang="en-US" smtClean="0"/>
-              <a:t>3/22/2022</a:t>
+              <a:t>4/11/2022</a:t>
             </a:fld>
             <a:endParaRPr lang="en-US"/>
           </a:p>
@@ -1591,7 +1594,7 @@
           <a:p>
             <a:fld id="{F94C261F-0441-47C0-ADC3-01E04E542625}" type="datetimeFigureOut">
               <a:rPr lang="en-US" smtClean="0"/>
-              <a:t>3/22/2022</a:t>
+              <a:t>4/11/2022</a:t>
             </a:fld>
             <a:endParaRPr lang="en-US"/>
           </a:p>
@@ -1958,7 +1961,7 @@
           <a:p>
             <a:fld id="{F94C261F-0441-47C0-ADC3-01E04E542625}" type="datetimeFigureOut">
               <a:rPr lang="en-US" smtClean="0"/>
-              <a:t>3/22/2022</a:t>
+              <a:t>4/11/2022</a:t>
             </a:fld>
             <a:endParaRPr lang="en-US"/>
           </a:p>
@@ -2076,7 +2079,7 @@
           <a:p>
             <a:fld id="{F94C261F-0441-47C0-ADC3-01E04E542625}" type="datetimeFigureOut">
               <a:rPr lang="en-US" smtClean="0"/>
-              <a:t>3/22/2022</a:t>
+              <a:t>4/11/2022</a:t>
             </a:fld>
             <a:endParaRPr lang="en-US"/>
           </a:p>
@@ -2171,7 +2174,7 @@
           <a:p>
             <a:fld id="{F94C261F-0441-47C0-ADC3-01E04E542625}" type="datetimeFigureOut">
               <a:rPr lang="en-US" smtClean="0"/>
-              <a:t>3/22/2022</a:t>
+              <a:t>4/11/2022</a:t>
             </a:fld>
             <a:endParaRPr lang="en-US"/>
           </a:p>
@@ -2448,7 +2451,7 @@
           <a:p>
             <a:fld id="{F94C261F-0441-47C0-ADC3-01E04E542625}" type="datetimeFigureOut">
               <a:rPr lang="en-US" smtClean="0"/>
-              <a:t>3/22/2022</a:t>
+              <a:t>4/11/2022</a:t>
             </a:fld>
             <a:endParaRPr lang="en-US"/>
           </a:p>
@@ -2701,7 +2704,7 @@
           <a:p>
             <a:fld id="{F94C261F-0441-47C0-ADC3-01E04E542625}" type="datetimeFigureOut">
               <a:rPr lang="en-US" smtClean="0"/>
-              <a:t>3/22/2022</a:t>
+              <a:t>4/11/2022</a:t>
             </a:fld>
             <a:endParaRPr lang="en-US"/>
           </a:p>
@@ -2914,7 +2917,7 @@
           <a:p>
             <a:fld id="{F94C261F-0441-47C0-ADC3-01E04E542625}" type="datetimeFigureOut">
               <a:rPr lang="en-US" smtClean="0"/>
-              <a:t>3/22/2022</a:t>
+              <a:t>4/11/2022</a:t>
             </a:fld>
             <a:endParaRPr lang="en-US"/>
           </a:p>
@@ -3300,6 +3303,130 @@
     </p:otherStyle>
   </p:txStyles>
 </p:sldMaster>
+</file>
+
+<file path=ppt/slides/slide1.xml><?xml version="1.0" encoding="utf-8"?>
+<p:sld xmlns:a="http://schemas.openxmlformats.org/drawingml/2006/main" xmlns:r="http://schemas.openxmlformats.org/officeDocument/2006/relationships" xmlns:p="http://schemas.openxmlformats.org/presentationml/2006/main">
+  <p:cSld>
+    <p:bg>
+      <p:bgPr>
+        <a:solidFill>
+          <a:schemeClr val="tx1"/>
+        </a:solidFill>
+        <a:effectLst/>
+      </p:bgPr>
+    </p:bg>
+    <p:spTree>
+      <p:nvGrpSpPr>
+        <p:cNvPr id="1" name=""/>
+        <p:cNvGrpSpPr/>
+        <p:nvPr/>
+      </p:nvGrpSpPr>
+      <p:grpSpPr>
+        <a:xfrm>
+          <a:off x="0" y="0"/>
+          <a:ext cx="0" cy="0"/>
+          <a:chOff x="0" y="0"/>
+          <a:chExt cx="0" cy="0"/>
+        </a:xfrm>
+      </p:grpSpPr>
+      <p:sp>
+        <p:nvSpPr>
+          <p:cNvPr id="2" name="Title 1"/>
+          <p:cNvSpPr>
+            <a:spLocks noGrp="1"/>
+          </p:cNvSpPr>
+          <p:nvPr>
+            <p:ph type="title"/>
+          </p:nvPr>
+        </p:nvSpPr>
+        <p:spPr>
+          <a:xfrm>
+            <a:off x="0" y="1"/>
+            <a:ext cx="12192000" cy="351692"/>
+          </a:xfrm>
+        </p:spPr>
+        <p:txBody>
+          <a:bodyPr>
+            <a:normAutofit/>
+          </a:bodyPr>
+          <a:lstStyle/>
+          <a:p>
+            <a:r>
+              <a:rPr lang="en-US" sz="1600" dirty="0" smtClean="0">
+                <a:solidFill>
+                  <a:schemeClr val="bg1"/>
+                </a:solidFill>
+              </a:rPr>
+              <a:t>Title-here</a:t>
+            </a:r>
+            <a:endParaRPr lang="en-US" sz="1600" dirty="0">
+              <a:solidFill>
+                <a:schemeClr val="bg1"/>
+              </a:solidFill>
+            </a:endParaRPr>
+          </a:p>
+        </p:txBody>
+      </p:sp>
+      <p:sp>
+        <p:nvSpPr>
+          <p:cNvPr id="3" name="Content Placeholder 2"/>
+          <p:cNvSpPr>
+            <a:spLocks noGrp="1"/>
+          </p:cNvSpPr>
+          <p:nvPr>
+            <p:ph sz="half" idx="1"/>
+          </p:nvPr>
+        </p:nvSpPr>
+        <p:spPr>
+          <a:xfrm>
+            <a:off x="0" y="351694"/>
+            <a:ext cx="6019800" cy="6506306"/>
+          </a:xfrm>
+        </p:spPr>
+        <p:txBody>
+          <a:bodyPr/>
+          <a:lstStyle/>
+          <a:p>
+            <a:endParaRPr lang="en-US" dirty="0"/>
+          </a:p>
+        </p:txBody>
+      </p:sp>
+      <p:sp>
+        <p:nvSpPr>
+          <p:cNvPr id="4" name="Content Placeholder 3"/>
+          <p:cNvSpPr>
+            <a:spLocks noGrp="1"/>
+          </p:cNvSpPr>
+          <p:nvPr>
+            <p:ph sz="half" idx="2"/>
+          </p:nvPr>
+        </p:nvSpPr>
+        <p:spPr>
+          <a:xfrm>
+            <a:off x="6099349" y="351693"/>
+            <a:ext cx="6092651" cy="6506307"/>
+          </a:xfrm>
+        </p:spPr>
+        <p:txBody>
+          <a:bodyPr/>
+          <a:lstStyle/>
+          <a:p>
+            <a:endParaRPr lang="en-US" dirty="0"/>
+          </a:p>
+        </p:txBody>
+      </p:sp>
+    </p:spTree>
+    <p:extLst>
+      <p:ext uri="{BB962C8B-B14F-4D97-AF65-F5344CB8AC3E}">
+        <p14:creationId xmlns:p14="http://schemas.microsoft.com/office/powerpoint/2010/main" val="2397256293"/>
+      </p:ext>
+    </p:extLst>
+  </p:cSld>
+  <p:clrMapOvr>
+    <a:masterClrMapping/>
+  </p:clrMapOvr>
+</p:sld>
 </file>
 
 <file path=ppt/theme/theme1.xml><?xml version="1.0" encoding="utf-8"?>

</xml_diff>